<commit_message>
doc pages in English
</commit_message>
<xml_diff>
--- a/content/doc/BaRatinAGE/02_mainFrame/MainFrame.fr.pptx
+++ b/content/doc/BaRatinAGE/02_mainFrame/MainFrame.fr.pptx
@@ -6,6 +6,7 @@
   </p:sldMasterIdLst>
   <p:sldIdLst>
     <p:sldId id="256" r:id="rId2"/>
+    <p:sldId id="257" r:id="rId3"/>
   </p:sldIdLst>
   <p:sldSz cx="12192000" cy="6858000"/>
   <p:notesSz cx="6858000" cy="9144000"/>
@@ -104,6 +105,11 @@
       </a:defRPr>
     </a:lvl9pPr>
   </p:defaultTextStyle>
+  <p:extLst>
+    <p:ext uri="{EFAFB233-063F-42B5-8137-9DF3F51BA10A}">
+      <p15:sldGuideLst xmlns:p15="http://schemas.microsoft.com/office/powerpoint/2012/main"/>
+    </p:ext>
+  </p:extLst>
 </p:presentation>
 </file>
 
@@ -238,7 +244,7 @@
           <a:p>
             <a:fld id="{8806ECEF-8F0A-44B1-9259-FB2C30F1DBEC}" type="datetimeFigureOut">
               <a:rPr lang="fr-FR" smtClean="0"/>
-              <a:t>26/02/2024</a:t>
+              <a:t>29/02/2024</a:t>
             </a:fld>
             <a:endParaRPr lang="fr-FR"/>
           </a:p>
@@ -408,7 +414,7 @@
           <a:p>
             <a:fld id="{8806ECEF-8F0A-44B1-9259-FB2C30F1DBEC}" type="datetimeFigureOut">
               <a:rPr lang="fr-FR" smtClean="0"/>
-              <a:t>26/02/2024</a:t>
+              <a:t>29/02/2024</a:t>
             </a:fld>
             <a:endParaRPr lang="fr-FR"/>
           </a:p>
@@ -588,7 +594,7 @@
           <a:p>
             <a:fld id="{8806ECEF-8F0A-44B1-9259-FB2C30F1DBEC}" type="datetimeFigureOut">
               <a:rPr lang="fr-FR" smtClean="0"/>
-              <a:t>26/02/2024</a:t>
+              <a:t>29/02/2024</a:t>
             </a:fld>
             <a:endParaRPr lang="fr-FR"/>
           </a:p>
@@ -758,7 +764,7 @@
           <a:p>
             <a:fld id="{8806ECEF-8F0A-44B1-9259-FB2C30F1DBEC}" type="datetimeFigureOut">
               <a:rPr lang="fr-FR" smtClean="0"/>
-              <a:t>26/02/2024</a:t>
+              <a:t>29/02/2024</a:t>
             </a:fld>
             <a:endParaRPr lang="fr-FR"/>
           </a:p>
@@ -1004,7 +1010,7 @@
           <a:p>
             <a:fld id="{8806ECEF-8F0A-44B1-9259-FB2C30F1DBEC}" type="datetimeFigureOut">
               <a:rPr lang="fr-FR" smtClean="0"/>
-              <a:t>26/02/2024</a:t>
+              <a:t>29/02/2024</a:t>
             </a:fld>
             <a:endParaRPr lang="fr-FR"/>
           </a:p>
@@ -1236,7 +1242,7 @@
           <a:p>
             <a:fld id="{8806ECEF-8F0A-44B1-9259-FB2C30F1DBEC}" type="datetimeFigureOut">
               <a:rPr lang="fr-FR" smtClean="0"/>
-              <a:t>26/02/2024</a:t>
+              <a:t>29/02/2024</a:t>
             </a:fld>
             <a:endParaRPr lang="fr-FR"/>
           </a:p>
@@ -1603,7 +1609,7 @@
           <a:p>
             <a:fld id="{8806ECEF-8F0A-44B1-9259-FB2C30F1DBEC}" type="datetimeFigureOut">
               <a:rPr lang="fr-FR" smtClean="0"/>
-              <a:t>26/02/2024</a:t>
+              <a:t>29/02/2024</a:t>
             </a:fld>
             <a:endParaRPr lang="fr-FR"/>
           </a:p>
@@ -1721,7 +1727,7 @@
           <a:p>
             <a:fld id="{8806ECEF-8F0A-44B1-9259-FB2C30F1DBEC}" type="datetimeFigureOut">
               <a:rPr lang="fr-FR" smtClean="0"/>
-              <a:t>26/02/2024</a:t>
+              <a:t>29/02/2024</a:t>
             </a:fld>
             <a:endParaRPr lang="fr-FR"/>
           </a:p>
@@ -1816,7 +1822,7 @@
           <a:p>
             <a:fld id="{8806ECEF-8F0A-44B1-9259-FB2C30F1DBEC}" type="datetimeFigureOut">
               <a:rPr lang="fr-FR" smtClean="0"/>
-              <a:t>26/02/2024</a:t>
+              <a:t>29/02/2024</a:t>
             </a:fld>
             <a:endParaRPr lang="fr-FR"/>
           </a:p>
@@ -2093,7 +2099,7 @@
           <a:p>
             <a:fld id="{8806ECEF-8F0A-44B1-9259-FB2C30F1DBEC}" type="datetimeFigureOut">
               <a:rPr lang="fr-FR" smtClean="0"/>
-              <a:t>26/02/2024</a:t>
+              <a:t>29/02/2024</a:t>
             </a:fld>
             <a:endParaRPr lang="fr-FR"/>
           </a:p>
@@ -2346,7 +2352,7 @@
           <a:p>
             <a:fld id="{8806ECEF-8F0A-44B1-9259-FB2C30F1DBEC}" type="datetimeFigureOut">
               <a:rPr lang="fr-FR" smtClean="0"/>
-              <a:t>26/02/2024</a:t>
+              <a:t>29/02/2024</a:t>
             </a:fld>
             <a:endParaRPr lang="fr-FR"/>
           </a:p>
@@ -2559,7 +2565,7 @@
           <a:p>
             <a:fld id="{8806ECEF-8F0A-44B1-9259-FB2C30F1DBEC}" type="datetimeFigureOut">
               <a:rPr lang="fr-FR" smtClean="0"/>
-              <a:t>26/02/2024</a:t>
+              <a:t>29/02/2024</a:t>
             </a:fld>
             <a:endParaRPr lang="fr-FR"/>
           </a:p>
@@ -4031,6 +4037,1130 @@
 </p:sld>
 </file>
 
+<file path=ppt/slides/slide2.xml><?xml version="1.0" encoding="utf-8"?>
+<p:sld xmlns:a="http://schemas.openxmlformats.org/drawingml/2006/main" xmlns:r="http://schemas.openxmlformats.org/officeDocument/2006/relationships" xmlns:p="http://schemas.openxmlformats.org/presentationml/2006/main">
+  <p:cSld>
+    <p:spTree>
+      <p:nvGrpSpPr>
+        <p:cNvPr id="1" name=""/>
+        <p:cNvGrpSpPr/>
+        <p:nvPr/>
+      </p:nvGrpSpPr>
+      <p:grpSpPr>
+        <a:xfrm>
+          <a:off x="0" y="0"/>
+          <a:ext cx="0" cy="0"/>
+          <a:chOff x="0" y="0"/>
+          <a:chExt cx="0" cy="0"/>
+        </a:xfrm>
+      </p:grpSpPr>
+      <p:pic>
+        <p:nvPicPr>
+          <p:cNvPr id="2" name="Image 1"/>
+          <p:cNvPicPr>
+            <a:picLocks noChangeAspect="1"/>
+          </p:cNvPicPr>
+          <p:nvPr/>
+        </p:nvPicPr>
+        <p:blipFill>
+          <a:blip r:embed="rId2">
+            <a:extLst>
+              <a:ext uri="{28A0092B-C50C-407E-A947-70E740481C1C}">
+                <a14:useLocalDpi xmlns:a14="http://schemas.microsoft.com/office/drawing/2010/main" val="0"/>
+              </a:ext>
+            </a:extLst>
+          </a:blip>
+          <a:stretch>
+            <a:fillRect/>
+          </a:stretch>
+        </p:blipFill>
+        <p:spPr>
+          <a:xfrm>
+            <a:off x="1758779" y="1474646"/>
+            <a:ext cx="8179220" cy="4559534"/>
+          </a:xfrm>
+          <a:prstGeom prst="rect">
+            <a:avLst/>
+          </a:prstGeom>
+        </p:spPr>
+      </p:pic>
+      <p:sp>
+        <p:nvSpPr>
+          <p:cNvPr id="5" name="Rectangle 4"/>
+          <p:cNvSpPr/>
+          <p:nvPr/>
+        </p:nvSpPr>
+        <p:spPr>
+          <a:xfrm>
+            <a:off x="1861033" y="1598206"/>
+            <a:ext cx="2056047" cy="183963"/>
+          </a:xfrm>
+          <a:prstGeom prst="rect">
+            <a:avLst/>
+          </a:prstGeom>
+          <a:noFill/>
+          <a:ln w="28575">
+            <a:solidFill>
+              <a:srgbClr val="FF0000"/>
+            </a:solidFill>
+          </a:ln>
+        </p:spPr>
+        <p:style>
+          <a:lnRef idx="2">
+            <a:schemeClr val="accent1">
+              <a:shade val="50000"/>
+            </a:schemeClr>
+          </a:lnRef>
+          <a:fillRef idx="1">
+            <a:schemeClr val="accent1"/>
+          </a:fillRef>
+          <a:effectRef idx="0">
+            <a:schemeClr val="accent1"/>
+          </a:effectRef>
+          <a:fontRef idx="minor">
+            <a:schemeClr val="lt1"/>
+          </a:fontRef>
+        </p:style>
+        <p:txBody>
+          <a:bodyPr rtlCol="0" anchor="ctr"/>
+          <a:lstStyle/>
+          <a:p>
+            <a:pPr algn="ctr"/>
+            <a:endParaRPr lang="fr-FR"/>
+          </a:p>
+        </p:txBody>
+      </p:sp>
+      <p:sp>
+        <p:nvSpPr>
+          <p:cNvPr id="6" name="Rectangle 5"/>
+          <p:cNvSpPr/>
+          <p:nvPr/>
+        </p:nvSpPr>
+        <p:spPr>
+          <a:xfrm>
+            <a:off x="1861033" y="1823279"/>
+            <a:ext cx="2672861" cy="272708"/>
+          </a:xfrm>
+          <a:prstGeom prst="rect">
+            <a:avLst/>
+          </a:prstGeom>
+          <a:noFill/>
+          <a:ln w="28575">
+            <a:solidFill>
+              <a:srgbClr val="FF0000"/>
+            </a:solidFill>
+          </a:ln>
+        </p:spPr>
+        <p:style>
+          <a:lnRef idx="2">
+            <a:schemeClr val="accent1">
+              <a:shade val="50000"/>
+            </a:schemeClr>
+          </a:lnRef>
+          <a:fillRef idx="1">
+            <a:schemeClr val="accent1"/>
+          </a:fillRef>
+          <a:effectRef idx="0">
+            <a:schemeClr val="accent1"/>
+          </a:effectRef>
+          <a:fontRef idx="minor">
+            <a:schemeClr val="lt1"/>
+          </a:fontRef>
+        </p:style>
+        <p:txBody>
+          <a:bodyPr rtlCol="0" anchor="ctr"/>
+          <a:lstStyle/>
+          <a:p>
+            <a:pPr algn="ctr"/>
+            <a:endParaRPr lang="fr-FR"/>
+          </a:p>
+        </p:txBody>
+      </p:sp>
+      <p:sp>
+        <p:nvSpPr>
+          <p:cNvPr id="7" name="Rectangle 6"/>
+          <p:cNvSpPr/>
+          <p:nvPr/>
+        </p:nvSpPr>
+        <p:spPr>
+          <a:xfrm>
+            <a:off x="1861033" y="2137096"/>
+            <a:ext cx="1309377" cy="3740935"/>
+          </a:xfrm>
+          <a:prstGeom prst="rect">
+            <a:avLst/>
+          </a:prstGeom>
+          <a:noFill/>
+          <a:ln w="28575">
+            <a:solidFill>
+              <a:srgbClr val="00B0F0"/>
+            </a:solidFill>
+          </a:ln>
+        </p:spPr>
+        <p:style>
+          <a:lnRef idx="2">
+            <a:schemeClr val="accent1">
+              <a:shade val="50000"/>
+            </a:schemeClr>
+          </a:lnRef>
+          <a:fillRef idx="1">
+            <a:schemeClr val="accent1"/>
+          </a:fillRef>
+          <a:effectRef idx="0">
+            <a:schemeClr val="accent1"/>
+          </a:effectRef>
+          <a:fontRef idx="minor">
+            <a:schemeClr val="lt1"/>
+          </a:fontRef>
+        </p:style>
+        <p:txBody>
+          <a:bodyPr rtlCol="0" anchor="ctr"/>
+          <a:lstStyle/>
+          <a:p>
+            <a:pPr algn="ctr"/>
+            <a:endParaRPr lang="fr-FR">
+              <a:solidFill>
+                <a:srgbClr val="00B0F0"/>
+              </a:solidFill>
+            </a:endParaRPr>
+          </a:p>
+        </p:txBody>
+      </p:sp>
+      <p:sp>
+        <p:nvSpPr>
+          <p:cNvPr id="8" name="Rectangle 7"/>
+          <p:cNvSpPr/>
+          <p:nvPr/>
+        </p:nvSpPr>
+        <p:spPr>
+          <a:xfrm>
+            <a:off x="3219105" y="2137096"/>
+            <a:ext cx="6595583" cy="278120"/>
+          </a:xfrm>
+          <a:prstGeom prst="rect">
+            <a:avLst/>
+          </a:prstGeom>
+          <a:noFill/>
+          <a:ln w="28575">
+            <a:solidFill>
+              <a:srgbClr val="00B0F0"/>
+            </a:solidFill>
+          </a:ln>
+        </p:spPr>
+        <p:style>
+          <a:lnRef idx="2">
+            <a:schemeClr val="accent1">
+              <a:shade val="50000"/>
+            </a:schemeClr>
+          </a:lnRef>
+          <a:fillRef idx="1">
+            <a:schemeClr val="accent1"/>
+          </a:fillRef>
+          <a:effectRef idx="0">
+            <a:schemeClr val="accent1"/>
+          </a:effectRef>
+          <a:fontRef idx="minor">
+            <a:schemeClr val="lt1"/>
+          </a:fontRef>
+        </p:style>
+        <p:txBody>
+          <a:bodyPr rtlCol="0" anchor="ctr"/>
+          <a:lstStyle/>
+          <a:p>
+            <a:pPr algn="ctr"/>
+            <a:endParaRPr lang="fr-FR"/>
+          </a:p>
+        </p:txBody>
+      </p:sp>
+      <p:sp>
+        <p:nvSpPr>
+          <p:cNvPr id="9" name="ZoneTexte 8"/>
+          <p:cNvSpPr txBox="1"/>
+          <p:nvPr/>
+        </p:nvSpPr>
+        <p:spPr>
+          <a:xfrm>
+            <a:off x="9868812" y="1243952"/>
+            <a:ext cx="1980266" cy="646331"/>
+          </a:xfrm>
+          <a:prstGeom prst="rect">
+            <a:avLst/>
+          </a:prstGeom>
+          <a:noFill/>
+        </p:spPr>
+        <p:txBody>
+          <a:bodyPr wrap="square" rtlCol="0">
+            <a:spAutoFit/>
+          </a:bodyPr>
+          <a:lstStyle/>
+          <a:p>
+            <a:r>
+              <a:rPr lang="fr-FR" dirty="0" smtClean="0">
+                <a:solidFill>
+                  <a:srgbClr val="00B0F0"/>
+                </a:solidFill>
+              </a:rPr>
+              <a:t>Descriptive Panel of the C</a:t>
+            </a:r>
+            <a:r>
+              <a:rPr lang="fr-FR" dirty="0" smtClean="0">
+                <a:solidFill>
+                  <a:srgbClr val="00B0F0"/>
+                </a:solidFill>
+              </a:rPr>
+              <a:t>omponent</a:t>
+            </a:r>
+            <a:endParaRPr lang="fr-FR" dirty="0">
+              <a:solidFill>
+                <a:srgbClr val="00B0F0"/>
+              </a:solidFill>
+            </a:endParaRPr>
+          </a:p>
+        </p:txBody>
+      </p:sp>
+      <p:sp>
+        <p:nvSpPr>
+          <p:cNvPr id="13" name="Forme libre 12"/>
+          <p:cNvSpPr/>
+          <p:nvPr/>
+        </p:nvSpPr>
+        <p:spPr>
+          <a:xfrm>
+            <a:off x="9998651" y="1884972"/>
+            <a:ext cx="954838" cy="384156"/>
+          </a:xfrm>
+          <a:custGeom>
+            <a:avLst/>
+            <a:gdLst>
+              <a:gd name="connsiteX0" fmla="*/ 946864 w 954838"/>
+              <a:gd name="connsiteY0" fmla="*/ 0 h 447464"/>
+              <a:gd name="connsiteX1" fmla="*/ 817009 w 954838"/>
+              <a:gd name="connsiteY1" fmla="*/ 389567 h 447464"/>
+              <a:gd name="connsiteX2" fmla="*/ 0 w 954838"/>
+              <a:gd name="connsiteY2" fmla="*/ 438262 h 447464"/>
+            </a:gdLst>
+            <a:ahLst/>
+            <a:cxnLst>
+              <a:cxn ang="0">
+                <a:pos x="connsiteX0" y="connsiteY0"/>
+              </a:cxn>
+              <a:cxn ang="0">
+                <a:pos x="connsiteX1" y="connsiteY1"/>
+              </a:cxn>
+              <a:cxn ang="0">
+                <a:pos x="connsiteX2" y="connsiteY2"/>
+              </a:cxn>
+            </a:cxnLst>
+            <a:rect l="l" t="t" r="r" b="b"/>
+            <a:pathLst>
+              <a:path w="954838" h="447464">
+                <a:moveTo>
+                  <a:pt x="946864" y="0"/>
+                </a:moveTo>
+                <a:cubicBezTo>
+                  <a:pt x="960842" y="158261"/>
+                  <a:pt x="974820" y="316523"/>
+                  <a:pt x="817009" y="389567"/>
+                </a:cubicBezTo>
+                <a:cubicBezTo>
+                  <a:pt x="659198" y="462611"/>
+                  <a:pt x="329599" y="450436"/>
+                  <a:pt x="0" y="438262"/>
+                </a:cubicBezTo>
+              </a:path>
+            </a:pathLst>
+          </a:custGeom>
+          <a:noFill/>
+          <a:ln w="28575">
+            <a:solidFill>
+              <a:srgbClr val="00B0F0"/>
+            </a:solidFill>
+            <a:headEnd type="none" w="med" len="med"/>
+            <a:tailEnd type="arrow" w="med" len="med"/>
+          </a:ln>
+        </p:spPr>
+        <p:style>
+          <a:lnRef idx="2">
+            <a:schemeClr val="accent1">
+              <a:shade val="50000"/>
+            </a:schemeClr>
+          </a:lnRef>
+          <a:fillRef idx="1">
+            <a:schemeClr val="accent1"/>
+          </a:fillRef>
+          <a:effectRef idx="0">
+            <a:schemeClr val="accent1"/>
+          </a:effectRef>
+          <a:fontRef idx="minor">
+            <a:schemeClr val="lt1"/>
+          </a:fontRef>
+        </p:style>
+        <p:txBody>
+          <a:bodyPr rtlCol="0" anchor="ctr"/>
+          <a:lstStyle/>
+          <a:p>
+            <a:pPr algn="ctr"/>
+            <a:endParaRPr lang="fr-FR"/>
+          </a:p>
+        </p:txBody>
+      </p:sp>
+      <p:sp>
+        <p:nvSpPr>
+          <p:cNvPr id="14" name="Rectangle 13"/>
+          <p:cNvSpPr/>
+          <p:nvPr/>
+        </p:nvSpPr>
+        <p:spPr>
+          <a:xfrm>
+            <a:off x="3219105" y="2467437"/>
+            <a:ext cx="6595583" cy="278120"/>
+          </a:xfrm>
+          <a:prstGeom prst="rect">
+            <a:avLst/>
+          </a:prstGeom>
+          <a:noFill/>
+          <a:ln w="28575">
+            <a:solidFill>
+              <a:srgbClr val="FFC000"/>
+            </a:solidFill>
+          </a:ln>
+        </p:spPr>
+        <p:style>
+          <a:lnRef idx="2">
+            <a:schemeClr val="accent1">
+              <a:shade val="50000"/>
+            </a:schemeClr>
+          </a:lnRef>
+          <a:fillRef idx="1">
+            <a:schemeClr val="accent1"/>
+          </a:fillRef>
+          <a:effectRef idx="0">
+            <a:schemeClr val="accent1"/>
+          </a:effectRef>
+          <a:fontRef idx="minor">
+            <a:schemeClr val="lt1"/>
+          </a:fontRef>
+        </p:style>
+        <p:txBody>
+          <a:bodyPr rtlCol="0" anchor="ctr"/>
+          <a:lstStyle/>
+          <a:p>
+            <a:pPr algn="ctr"/>
+            <a:endParaRPr lang="fr-FR"/>
+          </a:p>
+        </p:txBody>
+      </p:sp>
+      <p:sp>
+        <p:nvSpPr>
+          <p:cNvPr id="16" name="ZoneTexte 15"/>
+          <p:cNvSpPr txBox="1"/>
+          <p:nvPr/>
+        </p:nvSpPr>
+        <p:spPr>
+          <a:xfrm>
+            <a:off x="9840780" y="3023557"/>
+            <a:ext cx="1938207" cy="646331"/>
+          </a:xfrm>
+          <a:prstGeom prst="rect">
+            <a:avLst/>
+          </a:prstGeom>
+          <a:noFill/>
+        </p:spPr>
+        <p:txBody>
+          <a:bodyPr wrap="square" rtlCol="0">
+            <a:spAutoFit/>
+          </a:bodyPr>
+          <a:lstStyle/>
+          <a:p>
+            <a:r>
+              <a:rPr lang="fr-FR" dirty="0" err="1" smtClean="0">
+                <a:solidFill>
+                  <a:srgbClr val="FFC000"/>
+                </a:solidFill>
+              </a:rPr>
+              <a:t>Thematic</a:t>
+            </a:r>
+            <a:r>
+              <a:rPr lang="fr-FR" dirty="0" smtClean="0">
+                <a:solidFill>
+                  <a:srgbClr val="FFC000"/>
+                </a:solidFill>
+              </a:rPr>
+              <a:t> </a:t>
+            </a:r>
+            <a:r>
+              <a:rPr lang="fr-FR" dirty="0">
+                <a:solidFill>
+                  <a:srgbClr val="FFC000"/>
+                </a:solidFill>
+              </a:rPr>
+              <a:t>T</a:t>
+            </a:r>
+            <a:r>
+              <a:rPr lang="fr-FR" dirty="0" smtClean="0">
+                <a:solidFill>
+                  <a:srgbClr val="FFC000"/>
+                </a:solidFill>
+              </a:rPr>
+              <a:t>abs of the Component</a:t>
+            </a:r>
+            <a:endParaRPr lang="fr-FR" dirty="0">
+              <a:solidFill>
+                <a:srgbClr val="FFC000"/>
+              </a:solidFill>
+            </a:endParaRPr>
+          </a:p>
+        </p:txBody>
+      </p:sp>
+      <p:sp>
+        <p:nvSpPr>
+          <p:cNvPr id="17" name="Forme libre 16"/>
+          <p:cNvSpPr/>
+          <p:nvPr/>
+        </p:nvSpPr>
+        <p:spPr>
+          <a:xfrm>
+            <a:off x="9947310" y="2586982"/>
+            <a:ext cx="911635" cy="436574"/>
+          </a:xfrm>
+          <a:custGeom>
+            <a:avLst/>
+            <a:gdLst>
+              <a:gd name="connsiteX0" fmla="*/ 789955 w 789955"/>
+              <a:gd name="connsiteY0" fmla="*/ 261086 h 261086"/>
+              <a:gd name="connsiteX1" fmla="*/ 600582 w 789955"/>
+              <a:gd name="connsiteY1" fmla="*/ 28428 h 261086"/>
+              <a:gd name="connsiteX2" fmla="*/ 0 w 789955"/>
+              <a:gd name="connsiteY2" fmla="*/ 12196 h 261086"/>
+            </a:gdLst>
+            <a:ahLst/>
+            <a:cxnLst>
+              <a:cxn ang="0">
+                <a:pos x="connsiteX0" y="connsiteY0"/>
+              </a:cxn>
+              <a:cxn ang="0">
+                <a:pos x="connsiteX1" y="connsiteY1"/>
+              </a:cxn>
+              <a:cxn ang="0">
+                <a:pos x="connsiteX2" y="connsiteY2"/>
+              </a:cxn>
+            </a:cxnLst>
+            <a:rect l="l" t="t" r="r" b="b"/>
+            <a:pathLst>
+              <a:path w="789955" h="261086">
+                <a:moveTo>
+                  <a:pt x="789955" y="261086"/>
+                </a:moveTo>
+                <a:cubicBezTo>
+                  <a:pt x="761098" y="165498"/>
+                  <a:pt x="732241" y="69910"/>
+                  <a:pt x="600582" y="28428"/>
+                </a:cubicBezTo>
+                <a:cubicBezTo>
+                  <a:pt x="468923" y="-13054"/>
+                  <a:pt x="234461" y="-429"/>
+                  <a:pt x="0" y="12196"/>
+                </a:cubicBezTo>
+              </a:path>
+            </a:pathLst>
+          </a:custGeom>
+          <a:noFill/>
+          <a:ln w="28575">
+            <a:solidFill>
+              <a:srgbClr val="FFC000"/>
+            </a:solidFill>
+            <a:headEnd type="none" w="med" len="med"/>
+            <a:tailEnd type="arrow" w="med" len="med"/>
+          </a:ln>
+        </p:spPr>
+        <p:style>
+          <a:lnRef idx="2">
+            <a:schemeClr val="accent1">
+              <a:shade val="50000"/>
+            </a:schemeClr>
+          </a:lnRef>
+          <a:fillRef idx="1">
+            <a:schemeClr val="accent1"/>
+          </a:fillRef>
+          <a:effectRef idx="0">
+            <a:schemeClr val="accent1"/>
+          </a:effectRef>
+          <a:fontRef idx="minor">
+            <a:schemeClr val="lt1"/>
+          </a:fontRef>
+        </p:style>
+        <p:txBody>
+          <a:bodyPr rtlCol="0" anchor="ctr"/>
+          <a:lstStyle/>
+          <a:p>
+            <a:pPr algn="ctr"/>
+            <a:endParaRPr lang="fr-FR"/>
+          </a:p>
+        </p:txBody>
+      </p:sp>
+      <p:sp>
+        <p:nvSpPr>
+          <p:cNvPr id="18" name="Rectangle 17"/>
+          <p:cNvSpPr/>
+          <p:nvPr/>
+        </p:nvSpPr>
+        <p:spPr>
+          <a:xfrm>
+            <a:off x="3210990" y="2797777"/>
+            <a:ext cx="6595583" cy="3080253"/>
+          </a:xfrm>
+          <a:prstGeom prst="rect">
+            <a:avLst/>
+          </a:prstGeom>
+          <a:noFill/>
+          <a:ln w="28575">
+            <a:solidFill>
+              <a:srgbClr val="FFC000"/>
+            </a:solidFill>
+          </a:ln>
+        </p:spPr>
+        <p:style>
+          <a:lnRef idx="2">
+            <a:schemeClr val="accent1">
+              <a:shade val="50000"/>
+            </a:schemeClr>
+          </a:lnRef>
+          <a:fillRef idx="1">
+            <a:schemeClr val="accent1"/>
+          </a:fillRef>
+          <a:effectRef idx="0">
+            <a:schemeClr val="accent1"/>
+          </a:effectRef>
+          <a:fontRef idx="minor">
+            <a:schemeClr val="lt1"/>
+          </a:fontRef>
+        </p:style>
+        <p:txBody>
+          <a:bodyPr rtlCol="0" anchor="ctr"/>
+          <a:lstStyle/>
+          <a:p>
+            <a:pPr algn="ctr"/>
+            <a:endParaRPr lang="fr-FR"/>
+          </a:p>
+        </p:txBody>
+      </p:sp>
+      <p:sp>
+        <p:nvSpPr>
+          <p:cNvPr id="19" name="ZoneTexte 18"/>
+          <p:cNvSpPr txBox="1"/>
+          <p:nvPr/>
+        </p:nvSpPr>
+        <p:spPr>
+          <a:xfrm>
+            <a:off x="9947310" y="4954700"/>
+            <a:ext cx="1745925" cy="923330"/>
+          </a:xfrm>
+          <a:prstGeom prst="rect">
+            <a:avLst/>
+          </a:prstGeom>
+          <a:noFill/>
+        </p:spPr>
+        <p:txBody>
+          <a:bodyPr wrap="square" rtlCol="0">
+            <a:spAutoFit/>
+          </a:bodyPr>
+          <a:lstStyle/>
+          <a:p>
+            <a:r>
+              <a:rPr lang="fr-FR" dirty="0" smtClean="0">
+                <a:solidFill>
+                  <a:srgbClr val="FFC000"/>
+                </a:solidFill>
+              </a:rPr>
+              <a:t>Input, Computation and Chart Area</a:t>
+            </a:r>
+            <a:endParaRPr lang="fr-FR" dirty="0">
+              <a:solidFill>
+                <a:srgbClr val="FFC000"/>
+              </a:solidFill>
+            </a:endParaRPr>
+          </a:p>
+        </p:txBody>
+      </p:sp>
+      <p:sp>
+        <p:nvSpPr>
+          <p:cNvPr id="20" name="Forme libre 19"/>
+          <p:cNvSpPr/>
+          <p:nvPr/>
+        </p:nvSpPr>
+        <p:spPr>
+          <a:xfrm>
+            <a:off x="9998651" y="4248828"/>
+            <a:ext cx="911635" cy="705871"/>
+          </a:xfrm>
+          <a:custGeom>
+            <a:avLst/>
+            <a:gdLst>
+              <a:gd name="connsiteX0" fmla="*/ 789955 w 789955"/>
+              <a:gd name="connsiteY0" fmla="*/ 261086 h 261086"/>
+              <a:gd name="connsiteX1" fmla="*/ 600582 w 789955"/>
+              <a:gd name="connsiteY1" fmla="*/ 28428 h 261086"/>
+              <a:gd name="connsiteX2" fmla="*/ 0 w 789955"/>
+              <a:gd name="connsiteY2" fmla="*/ 12196 h 261086"/>
+            </a:gdLst>
+            <a:ahLst/>
+            <a:cxnLst>
+              <a:cxn ang="0">
+                <a:pos x="connsiteX0" y="connsiteY0"/>
+              </a:cxn>
+              <a:cxn ang="0">
+                <a:pos x="connsiteX1" y="connsiteY1"/>
+              </a:cxn>
+              <a:cxn ang="0">
+                <a:pos x="connsiteX2" y="connsiteY2"/>
+              </a:cxn>
+            </a:cxnLst>
+            <a:rect l="l" t="t" r="r" b="b"/>
+            <a:pathLst>
+              <a:path w="789955" h="261086">
+                <a:moveTo>
+                  <a:pt x="789955" y="261086"/>
+                </a:moveTo>
+                <a:cubicBezTo>
+                  <a:pt x="761098" y="165498"/>
+                  <a:pt x="732241" y="69910"/>
+                  <a:pt x="600582" y="28428"/>
+                </a:cubicBezTo>
+                <a:cubicBezTo>
+                  <a:pt x="468923" y="-13054"/>
+                  <a:pt x="234461" y="-429"/>
+                  <a:pt x="0" y="12196"/>
+                </a:cubicBezTo>
+              </a:path>
+            </a:pathLst>
+          </a:custGeom>
+          <a:noFill/>
+          <a:ln w="28575">
+            <a:solidFill>
+              <a:srgbClr val="FFC000"/>
+            </a:solidFill>
+            <a:headEnd type="none" w="med" len="med"/>
+            <a:tailEnd type="arrow" w="med" len="med"/>
+          </a:ln>
+        </p:spPr>
+        <p:style>
+          <a:lnRef idx="2">
+            <a:schemeClr val="accent1">
+              <a:shade val="50000"/>
+            </a:schemeClr>
+          </a:lnRef>
+          <a:fillRef idx="1">
+            <a:schemeClr val="accent1"/>
+          </a:fillRef>
+          <a:effectRef idx="0">
+            <a:schemeClr val="accent1"/>
+          </a:effectRef>
+          <a:fontRef idx="minor">
+            <a:schemeClr val="lt1"/>
+          </a:fontRef>
+        </p:style>
+        <p:txBody>
+          <a:bodyPr rtlCol="0" anchor="ctr"/>
+          <a:lstStyle/>
+          <a:p>
+            <a:pPr algn="ctr"/>
+            <a:endParaRPr lang="fr-FR"/>
+          </a:p>
+        </p:txBody>
+      </p:sp>
+      <p:sp>
+        <p:nvSpPr>
+          <p:cNvPr id="21" name="ZoneTexte 20"/>
+          <p:cNvSpPr txBox="1"/>
+          <p:nvPr/>
+        </p:nvSpPr>
+        <p:spPr>
+          <a:xfrm>
+            <a:off x="3740725" y="892488"/>
+            <a:ext cx="1109599" cy="369332"/>
+          </a:xfrm>
+          <a:prstGeom prst="rect">
+            <a:avLst/>
+          </a:prstGeom>
+          <a:noFill/>
+        </p:spPr>
+        <p:txBody>
+          <a:bodyPr wrap="none" rtlCol="0">
+            <a:spAutoFit/>
+          </a:bodyPr>
+          <a:lstStyle/>
+          <a:p>
+            <a:r>
+              <a:rPr lang="fr-FR" dirty="0" smtClean="0">
+                <a:solidFill>
+                  <a:srgbClr val="FF0000"/>
+                </a:solidFill>
+              </a:rPr>
+              <a:t>Menu Bar</a:t>
+            </a:r>
+            <a:endParaRPr lang="fr-FR" dirty="0">
+              <a:solidFill>
+                <a:srgbClr val="FF0000"/>
+              </a:solidFill>
+            </a:endParaRPr>
+          </a:p>
+        </p:txBody>
+      </p:sp>
+      <p:sp>
+        <p:nvSpPr>
+          <p:cNvPr id="23" name="Forme libre 22"/>
+          <p:cNvSpPr/>
+          <p:nvPr/>
+        </p:nvSpPr>
+        <p:spPr>
+          <a:xfrm>
+            <a:off x="2707988" y="1129375"/>
+            <a:ext cx="1032737" cy="366915"/>
+          </a:xfrm>
+          <a:custGeom>
+            <a:avLst/>
+            <a:gdLst>
+              <a:gd name="connsiteX0" fmla="*/ 1032737 w 1032737"/>
+              <a:gd name="connsiteY0" fmla="*/ 1155 h 366915"/>
+              <a:gd name="connsiteX1" fmla="*/ 162672 w 1032737"/>
+              <a:gd name="connsiteY1" fmla="*/ 56573 h 366915"/>
+              <a:gd name="connsiteX2" fmla="*/ 1959 w 1032737"/>
+              <a:gd name="connsiteY2" fmla="*/ 366915 h 366915"/>
+            </a:gdLst>
+            <a:ahLst/>
+            <a:cxnLst>
+              <a:cxn ang="0">
+                <a:pos x="connsiteX0" y="connsiteY0"/>
+              </a:cxn>
+              <a:cxn ang="0">
+                <a:pos x="connsiteX1" y="connsiteY1"/>
+              </a:cxn>
+              <a:cxn ang="0">
+                <a:pos x="connsiteX2" y="connsiteY2"/>
+              </a:cxn>
+            </a:cxnLst>
+            <a:rect l="l" t="t" r="r" b="b"/>
+            <a:pathLst>
+              <a:path w="1032737" h="366915">
+                <a:moveTo>
+                  <a:pt x="1032737" y="1155"/>
+                </a:moveTo>
+                <a:cubicBezTo>
+                  <a:pt x="683602" y="-1616"/>
+                  <a:pt x="334468" y="-4387"/>
+                  <a:pt x="162672" y="56573"/>
+                </a:cubicBezTo>
+                <a:cubicBezTo>
+                  <a:pt x="-9124" y="117533"/>
+                  <a:pt x="-3583" y="242224"/>
+                  <a:pt x="1959" y="366915"/>
+                </a:cubicBezTo>
+              </a:path>
+            </a:pathLst>
+          </a:custGeom>
+          <a:noFill/>
+          <a:ln w="28575">
+            <a:solidFill>
+              <a:srgbClr val="FF0000"/>
+            </a:solidFill>
+            <a:headEnd type="none" w="med" len="med"/>
+            <a:tailEnd type="arrow" w="med" len="med"/>
+          </a:ln>
+        </p:spPr>
+        <p:style>
+          <a:lnRef idx="2">
+            <a:schemeClr val="accent1">
+              <a:shade val="50000"/>
+            </a:schemeClr>
+          </a:lnRef>
+          <a:fillRef idx="1">
+            <a:schemeClr val="accent1"/>
+          </a:fillRef>
+          <a:effectRef idx="0">
+            <a:schemeClr val="accent1"/>
+          </a:effectRef>
+          <a:fontRef idx="minor">
+            <a:schemeClr val="lt1"/>
+          </a:fontRef>
+        </p:style>
+        <p:txBody>
+          <a:bodyPr rtlCol="0" anchor="ctr"/>
+          <a:lstStyle/>
+          <a:p>
+            <a:pPr algn="ctr"/>
+            <a:endParaRPr lang="fr-FR"/>
+          </a:p>
+        </p:txBody>
+      </p:sp>
+      <p:sp>
+        <p:nvSpPr>
+          <p:cNvPr id="24" name="ZoneTexte 23"/>
+          <p:cNvSpPr txBox="1"/>
+          <p:nvPr/>
+        </p:nvSpPr>
+        <p:spPr>
+          <a:xfrm>
+            <a:off x="394490" y="2376225"/>
+            <a:ext cx="941604" cy="369332"/>
+          </a:xfrm>
+          <a:prstGeom prst="rect">
+            <a:avLst/>
+          </a:prstGeom>
+          <a:noFill/>
+        </p:spPr>
+        <p:txBody>
+          <a:bodyPr wrap="none" rtlCol="0">
+            <a:spAutoFit/>
+          </a:bodyPr>
+          <a:lstStyle/>
+          <a:p>
+            <a:r>
+              <a:rPr lang="fr-FR" dirty="0" err="1" smtClean="0">
+                <a:solidFill>
+                  <a:srgbClr val="FF0000"/>
+                </a:solidFill>
+              </a:rPr>
+              <a:t>Tool</a:t>
+            </a:r>
+            <a:r>
+              <a:rPr lang="fr-FR" dirty="0" smtClean="0">
+                <a:solidFill>
+                  <a:srgbClr val="FF0000"/>
+                </a:solidFill>
+              </a:rPr>
+              <a:t> Bar</a:t>
+            </a:r>
+            <a:endParaRPr lang="fr-FR" dirty="0">
+              <a:solidFill>
+                <a:srgbClr val="FF0000"/>
+              </a:solidFill>
+            </a:endParaRPr>
+          </a:p>
+        </p:txBody>
+      </p:sp>
+      <p:sp>
+        <p:nvSpPr>
+          <p:cNvPr id="25" name="ZoneTexte 24"/>
+          <p:cNvSpPr txBox="1"/>
+          <p:nvPr/>
+        </p:nvSpPr>
+        <p:spPr>
+          <a:xfrm>
+            <a:off x="210526" y="4113585"/>
+            <a:ext cx="1506223" cy="646331"/>
+          </a:xfrm>
+          <a:prstGeom prst="rect">
+            <a:avLst/>
+          </a:prstGeom>
+          <a:noFill/>
+        </p:spPr>
+        <p:txBody>
+          <a:bodyPr wrap="square" rtlCol="0">
+            <a:spAutoFit/>
+          </a:bodyPr>
+          <a:lstStyle/>
+          <a:p>
+            <a:r>
+              <a:rPr lang="fr-FR" dirty="0" smtClean="0">
+                <a:solidFill>
+                  <a:srgbClr val="00B0F0"/>
+                </a:solidFill>
+              </a:rPr>
+              <a:t>Component Explorer</a:t>
+            </a:r>
+            <a:endParaRPr lang="fr-FR" dirty="0">
+              <a:solidFill>
+                <a:srgbClr val="00B0F0"/>
+              </a:solidFill>
+            </a:endParaRPr>
+          </a:p>
+        </p:txBody>
+      </p:sp>
+      <p:sp>
+        <p:nvSpPr>
+          <p:cNvPr id="26" name="Forme libre 25"/>
+          <p:cNvSpPr/>
+          <p:nvPr/>
+        </p:nvSpPr>
+        <p:spPr>
+          <a:xfrm rot="10800000">
+            <a:off x="813252" y="3729429"/>
+            <a:ext cx="954838" cy="384156"/>
+          </a:xfrm>
+          <a:custGeom>
+            <a:avLst/>
+            <a:gdLst>
+              <a:gd name="connsiteX0" fmla="*/ 946864 w 954838"/>
+              <a:gd name="connsiteY0" fmla="*/ 0 h 447464"/>
+              <a:gd name="connsiteX1" fmla="*/ 817009 w 954838"/>
+              <a:gd name="connsiteY1" fmla="*/ 389567 h 447464"/>
+              <a:gd name="connsiteX2" fmla="*/ 0 w 954838"/>
+              <a:gd name="connsiteY2" fmla="*/ 438262 h 447464"/>
+            </a:gdLst>
+            <a:ahLst/>
+            <a:cxnLst>
+              <a:cxn ang="0">
+                <a:pos x="connsiteX0" y="connsiteY0"/>
+              </a:cxn>
+              <a:cxn ang="0">
+                <a:pos x="connsiteX1" y="connsiteY1"/>
+              </a:cxn>
+              <a:cxn ang="0">
+                <a:pos x="connsiteX2" y="connsiteY2"/>
+              </a:cxn>
+            </a:cxnLst>
+            <a:rect l="l" t="t" r="r" b="b"/>
+            <a:pathLst>
+              <a:path w="954838" h="447464">
+                <a:moveTo>
+                  <a:pt x="946864" y="0"/>
+                </a:moveTo>
+                <a:cubicBezTo>
+                  <a:pt x="960842" y="158261"/>
+                  <a:pt x="974820" y="316523"/>
+                  <a:pt x="817009" y="389567"/>
+                </a:cubicBezTo>
+                <a:cubicBezTo>
+                  <a:pt x="659198" y="462611"/>
+                  <a:pt x="329599" y="450436"/>
+                  <a:pt x="0" y="438262"/>
+                </a:cubicBezTo>
+              </a:path>
+            </a:pathLst>
+          </a:custGeom>
+          <a:noFill/>
+          <a:ln w="28575">
+            <a:solidFill>
+              <a:srgbClr val="00B0F0"/>
+            </a:solidFill>
+            <a:headEnd type="none" w="med" len="med"/>
+            <a:tailEnd type="arrow" w="med" len="med"/>
+          </a:ln>
+        </p:spPr>
+        <p:style>
+          <a:lnRef idx="2">
+            <a:schemeClr val="accent1">
+              <a:shade val="50000"/>
+            </a:schemeClr>
+          </a:lnRef>
+          <a:fillRef idx="1">
+            <a:schemeClr val="accent1"/>
+          </a:fillRef>
+          <a:effectRef idx="0">
+            <a:schemeClr val="accent1"/>
+          </a:effectRef>
+          <a:fontRef idx="minor">
+            <a:schemeClr val="lt1"/>
+          </a:fontRef>
+        </p:style>
+        <p:txBody>
+          <a:bodyPr rtlCol="0" anchor="ctr"/>
+          <a:lstStyle/>
+          <a:p>
+            <a:pPr algn="ctr"/>
+            <a:endParaRPr lang="fr-FR"/>
+          </a:p>
+        </p:txBody>
+      </p:sp>
+      <p:sp>
+        <p:nvSpPr>
+          <p:cNvPr id="27" name="Forme libre 26"/>
+          <p:cNvSpPr/>
+          <p:nvPr/>
+        </p:nvSpPr>
+        <p:spPr>
+          <a:xfrm rot="10800000">
+            <a:off x="813252" y="1992068"/>
+            <a:ext cx="954838" cy="384156"/>
+          </a:xfrm>
+          <a:custGeom>
+            <a:avLst/>
+            <a:gdLst>
+              <a:gd name="connsiteX0" fmla="*/ 946864 w 954838"/>
+              <a:gd name="connsiteY0" fmla="*/ 0 h 447464"/>
+              <a:gd name="connsiteX1" fmla="*/ 817009 w 954838"/>
+              <a:gd name="connsiteY1" fmla="*/ 389567 h 447464"/>
+              <a:gd name="connsiteX2" fmla="*/ 0 w 954838"/>
+              <a:gd name="connsiteY2" fmla="*/ 438262 h 447464"/>
+            </a:gdLst>
+            <a:ahLst/>
+            <a:cxnLst>
+              <a:cxn ang="0">
+                <a:pos x="connsiteX0" y="connsiteY0"/>
+              </a:cxn>
+              <a:cxn ang="0">
+                <a:pos x="connsiteX1" y="connsiteY1"/>
+              </a:cxn>
+              <a:cxn ang="0">
+                <a:pos x="connsiteX2" y="connsiteY2"/>
+              </a:cxn>
+            </a:cxnLst>
+            <a:rect l="l" t="t" r="r" b="b"/>
+            <a:pathLst>
+              <a:path w="954838" h="447464">
+                <a:moveTo>
+                  <a:pt x="946864" y="0"/>
+                </a:moveTo>
+                <a:cubicBezTo>
+                  <a:pt x="960842" y="158261"/>
+                  <a:pt x="974820" y="316523"/>
+                  <a:pt x="817009" y="389567"/>
+                </a:cubicBezTo>
+                <a:cubicBezTo>
+                  <a:pt x="659198" y="462611"/>
+                  <a:pt x="329599" y="450436"/>
+                  <a:pt x="0" y="438262"/>
+                </a:cubicBezTo>
+              </a:path>
+            </a:pathLst>
+          </a:custGeom>
+          <a:noFill/>
+          <a:ln w="28575">
+            <a:solidFill>
+              <a:srgbClr val="FF0000"/>
+            </a:solidFill>
+            <a:headEnd type="none" w="med" len="med"/>
+            <a:tailEnd type="arrow" w="med" len="med"/>
+          </a:ln>
+        </p:spPr>
+        <p:style>
+          <a:lnRef idx="2">
+            <a:schemeClr val="accent1">
+              <a:shade val="50000"/>
+            </a:schemeClr>
+          </a:lnRef>
+          <a:fillRef idx="1">
+            <a:schemeClr val="accent1"/>
+          </a:fillRef>
+          <a:effectRef idx="0">
+            <a:schemeClr val="accent1"/>
+          </a:effectRef>
+          <a:fontRef idx="minor">
+            <a:schemeClr val="lt1"/>
+          </a:fontRef>
+        </p:style>
+        <p:txBody>
+          <a:bodyPr rtlCol="0" anchor="ctr"/>
+          <a:lstStyle/>
+          <a:p>
+            <a:pPr algn="ctr"/>
+            <a:endParaRPr lang="fr-FR"/>
+          </a:p>
+        </p:txBody>
+      </p:sp>
+    </p:spTree>
+    <p:extLst>
+      <p:ext uri="{BB962C8B-B14F-4D97-AF65-F5344CB8AC3E}">
+        <p14:creationId xmlns:p14="http://schemas.microsoft.com/office/powerpoint/2010/main" val="1832681147"/>
+      </p:ext>
+    </p:extLst>
+  </p:cSld>
+  <p:clrMapOvr>
+    <a:masterClrMapping/>
+  </p:clrMapOvr>
+</p:sld>
+</file>
+
 <file path=ppt/theme/theme1.xml><?xml version="1.0" encoding="utf-8"?>
 <a:theme xmlns:a="http://schemas.openxmlformats.org/drawingml/2006/main" name="Thème Office">
   <a:themeElements>

</xml_diff>